<commit_message>
using list works now
</commit_message>
<xml_diff>
--- a/presentaiton.pptx
+++ b/presentaiton.pptx
@@ -181,7 +181,7 @@
           <a:noFill/>
           <a:extLst>
             <a:ext uri="{909E8E84-426E-40dd-AFC4-6F175D3DCCD1}">
-              <a14:hiddenFill xmlns="" xmlns:a14="http://schemas.microsoft.com/office/drawing/2010/main">
+              <a14:hiddenFill xmlns:a14="http://schemas.microsoft.com/office/drawing/2010/main" xmlns="">
                 <a:solidFill>
                   <a:srgbClr val="FFFFFF"/>
                 </a:solidFill>
@@ -240,7 +240,7 @@
             </a:ln>
             <a:extLst>
               <a:ext uri="{91240B29-F687-4f45-9708-019B960494DF}">
-                <a14:hiddenLine xmlns="" xmlns:a14="http://schemas.microsoft.com/office/drawing/2010/main" w="9525">
+                <a14:hiddenLine xmlns:a14="http://schemas.microsoft.com/office/drawing/2010/main" xmlns="" w="9525">
                   <a:solidFill>
                     <a:srgbClr val="000000"/>
                   </a:solidFill>
@@ -330,7 +330,7 @@
             </a:ln>
             <a:extLst>
               <a:ext uri="{91240B29-F687-4f45-9708-019B960494DF}">
-                <a14:hiddenLine xmlns="" xmlns:a14="http://schemas.microsoft.com/office/drawing/2010/main" w="9525">
+                <a14:hiddenLine xmlns:a14="http://schemas.microsoft.com/office/drawing/2010/main" xmlns="" w="9525">
                   <a:solidFill>
                     <a:srgbClr val="000000"/>
                   </a:solidFill>
@@ -420,7 +420,7 @@
             </a:ln>
             <a:extLst>
               <a:ext uri="{91240B29-F687-4f45-9708-019B960494DF}">
-                <a14:hiddenLine xmlns="" xmlns:a14="http://schemas.microsoft.com/office/drawing/2010/main" w="9525">
+                <a14:hiddenLine xmlns:a14="http://schemas.microsoft.com/office/drawing/2010/main" xmlns="" w="9525">
                   <a:solidFill>
                     <a:srgbClr val="000000"/>
                   </a:solidFill>
@@ -454,7 +454,7 @@
             </a:ln>
             <a:extLst>
               <a:ext uri="{91240B29-F687-4f45-9708-019B960494DF}">
-                <a14:hiddenLine xmlns="" xmlns:a14="http://schemas.microsoft.com/office/drawing/2010/main" w="9525">
+                <a14:hiddenLine xmlns:a14="http://schemas.microsoft.com/office/drawing/2010/main" xmlns="" w="9525">
                   <a:solidFill>
                     <a:srgbClr val="000000"/>
                   </a:solidFill>
@@ -544,7 +544,7 @@
             </a:ln>
             <a:extLst>
               <a:ext uri="{91240B29-F687-4f45-9708-019B960494DF}">
-                <a14:hiddenLine xmlns="" xmlns:a14="http://schemas.microsoft.com/office/drawing/2010/main" w="9525">
+                <a14:hiddenLine xmlns:a14="http://schemas.microsoft.com/office/drawing/2010/main" xmlns="" w="9525">
                   <a:solidFill>
                     <a:srgbClr val="000000"/>
                   </a:solidFill>
@@ -606,7 +606,7 @@
             </a:ln>
             <a:extLst>
               <a:ext uri="{91240B29-F687-4f45-9708-019B960494DF}">
-                <a14:hiddenLine xmlns="" xmlns:a14="http://schemas.microsoft.com/office/drawing/2010/main" w="9525">
+                <a14:hiddenLine xmlns:a14="http://schemas.microsoft.com/office/drawing/2010/main" xmlns="" w="9525">
                   <a:solidFill>
                     <a:srgbClr val="000000"/>
                   </a:solidFill>
@@ -668,7 +668,7 @@
             </a:ln>
             <a:extLst>
               <a:ext uri="{91240B29-F687-4f45-9708-019B960494DF}">
-                <a14:hiddenLine xmlns="" xmlns:a14="http://schemas.microsoft.com/office/drawing/2010/main" w="9525">
+                <a14:hiddenLine xmlns:a14="http://schemas.microsoft.com/office/drawing/2010/main" xmlns="" w="9525">
                   <a:solidFill>
                     <a:srgbClr val="000000"/>
                   </a:solidFill>
@@ -758,7 +758,7 @@
             </a:ln>
             <a:extLst>
               <a:ext uri="{91240B29-F687-4f45-9708-019B960494DF}">
-                <a14:hiddenLine xmlns="" xmlns:a14="http://schemas.microsoft.com/office/drawing/2010/main" w="9525">
+                <a14:hiddenLine xmlns:a14="http://schemas.microsoft.com/office/drawing/2010/main" xmlns="" w="9525">
                   <a:solidFill>
                     <a:srgbClr val="000000"/>
                   </a:solidFill>
@@ -820,7 +820,7 @@
             </a:ln>
             <a:extLst>
               <a:ext uri="{91240B29-F687-4f45-9708-019B960494DF}">
-                <a14:hiddenLine xmlns="" xmlns:a14="http://schemas.microsoft.com/office/drawing/2010/main" w="9525">
+                <a14:hiddenLine xmlns:a14="http://schemas.microsoft.com/office/drawing/2010/main" xmlns="" w="9525">
                   <a:solidFill>
                     <a:srgbClr val="000000"/>
                   </a:solidFill>
@@ -882,7 +882,7 @@
             </a:ln>
             <a:extLst>
               <a:ext uri="{91240B29-F687-4f45-9708-019B960494DF}">
-                <a14:hiddenLine xmlns="" xmlns:a14="http://schemas.microsoft.com/office/drawing/2010/main" w="9525">
+                <a14:hiddenLine xmlns:a14="http://schemas.microsoft.com/office/drawing/2010/main" xmlns="" w="9525">
                   <a:solidFill>
                     <a:srgbClr val="000000"/>
                   </a:solidFill>
@@ -972,7 +972,7 @@
             </a:ln>
             <a:extLst>
               <a:ext uri="{91240B29-F687-4f45-9708-019B960494DF}">
-                <a14:hiddenLine xmlns="" xmlns:a14="http://schemas.microsoft.com/office/drawing/2010/main" w="9525">
+                <a14:hiddenLine xmlns:a14="http://schemas.microsoft.com/office/drawing/2010/main" xmlns="" w="9525">
                   <a:solidFill>
                     <a:srgbClr val="000000"/>
                   </a:solidFill>
@@ -1062,7 +1062,7 @@
             </a:ln>
             <a:extLst>
               <a:ext uri="{91240B29-F687-4f45-9708-019B960494DF}">
-                <a14:hiddenLine xmlns="" xmlns:a14="http://schemas.microsoft.com/office/drawing/2010/main" w="9525">
+                <a14:hiddenLine xmlns:a14="http://schemas.microsoft.com/office/drawing/2010/main" xmlns="" w="9525">
                   <a:solidFill>
                     <a:srgbClr val="000000"/>
                   </a:solidFill>
@@ -1124,7 +1124,7 @@
             </a:ln>
             <a:extLst>
               <a:ext uri="{91240B29-F687-4f45-9708-019B960494DF}">
-                <a14:hiddenLine xmlns="" xmlns:a14="http://schemas.microsoft.com/office/drawing/2010/main" w="9525">
+                <a14:hiddenLine xmlns:a14="http://schemas.microsoft.com/office/drawing/2010/main" xmlns="" w="9525">
                   <a:solidFill>
                     <a:srgbClr val="000000"/>
                   </a:solidFill>
@@ -1234,7 +1234,7 @@
             </a:ln>
             <a:extLst>
               <a:ext uri="{91240B29-F687-4f45-9708-019B960494DF}">
-                <a14:hiddenLine xmlns="" xmlns:a14="http://schemas.microsoft.com/office/drawing/2010/main" w="9525">
+                <a14:hiddenLine xmlns:a14="http://schemas.microsoft.com/office/drawing/2010/main" xmlns="" w="9525">
                   <a:solidFill>
                     <a:srgbClr val="000000"/>
                   </a:solidFill>
@@ -1296,7 +1296,7 @@
             </a:ln>
             <a:extLst>
               <a:ext uri="{91240B29-F687-4f45-9708-019B960494DF}">
-                <a14:hiddenLine xmlns="" xmlns:a14="http://schemas.microsoft.com/office/drawing/2010/main" w="9525">
+                <a14:hiddenLine xmlns:a14="http://schemas.microsoft.com/office/drawing/2010/main" xmlns="" w="9525">
                   <a:solidFill>
                     <a:srgbClr val="000000"/>
                   </a:solidFill>
@@ -1386,7 +1386,7 @@
             </a:ln>
             <a:extLst>
               <a:ext uri="{91240B29-F687-4f45-9708-019B960494DF}">
-                <a14:hiddenLine xmlns="" xmlns:a14="http://schemas.microsoft.com/office/drawing/2010/main" w="9525">
+                <a14:hiddenLine xmlns:a14="http://schemas.microsoft.com/office/drawing/2010/main" xmlns="" w="9525">
                   <a:solidFill>
                     <a:srgbClr val="000000"/>
                   </a:solidFill>
@@ -1476,7 +1476,7 @@
             </a:ln>
             <a:extLst>
               <a:ext uri="{91240B29-F687-4f45-9708-019B960494DF}">
-                <a14:hiddenLine xmlns="" xmlns:a14="http://schemas.microsoft.com/office/drawing/2010/main" w="9525">
+                <a14:hiddenLine xmlns:a14="http://schemas.microsoft.com/office/drawing/2010/main" xmlns="" w="9525">
                   <a:solidFill>
                     <a:srgbClr val="000000"/>
                   </a:solidFill>
@@ -1538,7 +1538,7 @@
             </a:ln>
             <a:extLst>
               <a:ext uri="{91240B29-F687-4f45-9708-019B960494DF}">
-                <a14:hiddenLine xmlns="" xmlns:a14="http://schemas.microsoft.com/office/drawing/2010/main" w="9525">
+                <a14:hiddenLine xmlns:a14="http://schemas.microsoft.com/office/drawing/2010/main" xmlns="" w="9525">
                   <a:solidFill>
                     <a:srgbClr val="000000"/>
                   </a:solidFill>
@@ -1628,7 +1628,7 @@
             </a:ln>
             <a:extLst>
               <a:ext uri="{91240B29-F687-4f45-9708-019B960494DF}">
-                <a14:hiddenLine xmlns="" xmlns:a14="http://schemas.microsoft.com/office/drawing/2010/main" w="9525">
+                <a14:hiddenLine xmlns:a14="http://schemas.microsoft.com/office/drawing/2010/main" xmlns="" w="9525">
                   <a:solidFill>
                     <a:srgbClr val="000000"/>
                   </a:solidFill>
@@ -1718,7 +1718,7 @@
             </a:ln>
             <a:extLst>
               <a:ext uri="{91240B29-F687-4f45-9708-019B960494DF}">
-                <a14:hiddenLine xmlns="" xmlns:a14="http://schemas.microsoft.com/office/drawing/2010/main" w="9525">
+                <a14:hiddenLine xmlns:a14="http://schemas.microsoft.com/office/drawing/2010/main" xmlns="" w="9525">
                   <a:solidFill>
                     <a:srgbClr val="000000"/>
                   </a:solidFill>
@@ -1774,7 +1774,7 @@
             </a:ln>
             <a:extLst>
               <a:ext uri="{91240B29-F687-4f45-9708-019B960494DF}">
-                <a14:hiddenLine xmlns="" xmlns:a14="http://schemas.microsoft.com/office/drawing/2010/main" w="9525">
+                <a14:hiddenLine xmlns:a14="http://schemas.microsoft.com/office/drawing/2010/main" xmlns="" w="9525">
                   <a:solidFill>
                     <a:srgbClr val="000000"/>
                   </a:solidFill>
@@ -1864,7 +1864,7 @@
             </a:ln>
             <a:extLst>
               <a:ext uri="{91240B29-F687-4f45-9708-019B960494DF}">
-                <a14:hiddenLine xmlns="" xmlns:a14="http://schemas.microsoft.com/office/drawing/2010/main" w="9525">
+                <a14:hiddenLine xmlns:a14="http://schemas.microsoft.com/office/drawing/2010/main" xmlns="" w="9525">
                   <a:solidFill>
                     <a:srgbClr val="000000"/>
                   </a:solidFill>
@@ -1920,7 +1920,7 @@
             </a:ln>
             <a:extLst>
               <a:ext uri="{91240B29-F687-4f45-9708-019B960494DF}">
-                <a14:hiddenLine xmlns="" xmlns:a14="http://schemas.microsoft.com/office/drawing/2010/main" w="9525">
+                <a14:hiddenLine xmlns:a14="http://schemas.microsoft.com/office/drawing/2010/main" xmlns="" w="9525">
                   <a:solidFill>
                     <a:srgbClr val="000000"/>
                   </a:solidFill>
@@ -2010,7 +2010,7 @@
             </a:ln>
             <a:extLst>
               <a:ext uri="{91240B29-F687-4f45-9708-019B960494DF}">
-                <a14:hiddenLine xmlns="" xmlns:a14="http://schemas.microsoft.com/office/drawing/2010/main" w="9525">
+                <a14:hiddenLine xmlns:a14="http://schemas.microsoft.com/office/drawing/2010/main" xmlns="" w="9525">
                   <a:solidFill>
                     <a:srgbClr val="000000"/>
                   </a:solidFill>
@@ -2078,7 +2078,7 @@
             </a:ln>
             <a:extLst>
               <a:ext uri="{91240B29-F687-4f45-9708-019B960494DF}">
-                <a14:hiddenLine xmlns="" xmlns:a14="http://schemas.microsoft.com/office/drawing/2010/main" w="9525">
+                <a14:hiddenLine xmlns:a14="http://schemas.microsoft.com/office/drawing/2010/main" xmlns="" w="9525">
                   <a:solidFill>
                     <a:srgbClr val="000000"/>
                   </a:solidFill>
@@ -2168,7 +2168,7 @@
             </a:ln>
             <a:extLst>
               <a:ext uri="{91240B29-F687-4f45-9708-019B960494DF}">
-                <a14:hiddenLine xmlns="" xmlns:a14="http://schemas.microsoft.com/office/drawing/2010/main" w="9525">
+                <a14:hiddenLine xmlns:a14="http://schemas.microsoft.com/office/drawing/2010/main" xmlns="" w="9525">
                   <a:solidFill>
                     <a:srgbClr val="000000"/>
                   </a:solidFill>
@@ -2236,7 +2236,7 @@
             </a:ln>
             <a:extLst>
               <a:ext uri="{91240B29-F687-4f45-9708-019B960494DF}">
-                <a14:hiddenLine xmlns="" xmlns:a14="http://schemas.microsoft.com/office/drawing/2010/main" w="9525">
+                <a14:hiddenLine xmlns:a14="http://schemas.microsoft.com/office/drawing/2010/main" xmlns="" w="9525">
                   <a:solidFill>
                     <a:srgbClr val="000000"/>
                   </a:solidFill>
@@ -2326,7 +2326,7 @@
             </a:ln>
             <a:extLst>
               <a:ext uri="{91240B29-F687-4f45-9708-019B960494DF}">
-                <a14:hiddenLine xmlns="" xmlns:a14="http://schemas.microsoft.com/office/drawing/2010/main" w="9525">
+                <a14:hiddenLine xmlns:a14="http://schemas.microsoft.com/office/drawing/2010/main" xmlns="" w="9525">
                   <a:solidFill>
                     <a:srgbClr val="000000"/>
                   </a:solidFill>
@@ -2360,7 +2360,7 @@
             </a:ln>
             <a:extLst>
               <a:ext uri="{91240B29-F687-4f45-9708-019B960494DF}">
-                <a14:hiddenLine xmlns="" xmlns:a14="http://schemas.microsoft.com/office/drawing/2010/main" w="9525">
+                <a14:hiddenLine xmlns:a14="http://schemas.microsoft.com/office/drawing/2010/main" xmlns="" w="9525">
                   <a:solidFill>
                     <a:srgbClr val="000000"/>
                   </a:solidFill>
@@ -2450,7 +2450,7 @@
             </a:ln>
             <a:extLst>
               <a:ext uri="{91240B29-F687-4f45-9708-019B960494DF}">
-                <a14:hiddenLine xmlns="" xmlns:a14="http://schemas.microsoft.com/office/drawing/2010/main" w="9525">
+                <a14:hiddenLine xmlns:a14="http://schemas.microsoft.com/office/drawing/2010/main" xmlns="" w="9525">
                   <a:solidFill>
                     <a:srgbClr val="000000"/>
                   </a:solidFill>
@@ -2512,7 +2512,7 @@
             </a:ln>
             <a:extLst>
               <a:ext uri="{91240B29-F687-4f45-9708-019B960494DF}">
-                <a14:hiddenLine xmlns="" xmlns:a14="http://schemas.microsoft.com/office/drawing/2010/main" w="9525">
+                <a14:hiddenLine xmlns:a14="http://schemas.microsoft.com/office/drawing/2010/main" xmlns="" w="9525">
                   <a:solidFill>
                     <a:srgbClr val="000000"/>
                   </a:solidFill>
@@ -2574,7 +2574,7 @@
             </a:ln>
             <a:extLst>
               <a:ext uri="{91240B29-F687-4f45-9708-019B960494DF}">
-                <a14:hiddenLine xmlns="" xmlns:a14="http://schemas.microsoft.com/office/drawing/2010/main" w="9525">
+                <a14:hiddenLine xmlns:a14="http://schemas.microsoft.com/office/drawing/2010/main" xmlns="" w="9525">
                   <a:solidFill>
                     <a:srgbClr val="000000"/>
                   </a:solidFill>
@@ -2664,7 +2664,7 @@
             </a:ln>
             <a:extLst>
               <a:ext uri="{91240B29-F687-4f45-9708-019B960494DF}">
-                <a14:hiddenLine xmlns="" xmlns:a14="http://schemas.microsoft.com/office/drawing/2010/main" w="9525">
+                <a14:hiddenLine xmlns:a14="http://schemas.microsoft.com/office/drawing/2010/main" xmlns="" w="9525">
                   <a:solidFill>
                     <a:srgbClr val="000000"/>
                   </a:solidFill>
@@ -2732,7 +2732,7 @@
             </a:ln>
             <a:extLst>
               <a:ext uri="{91240B29-F687-4f45-9708-019B960494DF}">
-                <a14:hiddenLine xmlns="" xmlns:a14="http://schemas.microsoft.com/office/drawing/2010/main" w="9525">
+                <a14:hiddenLine xmlns:a14="http://schemas.microsoft.com/office/drawing/2010/main" xmlns="" w="9525">
                   <a:solidFill>
                     <a:srgbClr val="000000"/>
                   </a:solidFill>
@@ -2794,7 +2794,7 @@
             </a:ln>
             <a:extLst>
               <a:ext uri="{91240B29-F687-4f45-9708-019B960494DF}">
-                <a14:hiddenLine xmlns="" xmlns:a14="http://schemas.microsoft.com/office/drawing/2010/main" w="9525">
+                <a14:hiddenLine xmlns:a14="http://schemas.microsoft.com/office/drawing/2010/main" xmlns="" w="9525">
                   <a:solidFill>
                     <a:srgbClr val="000000"/>
                   </a:solidFill>
@@ -2884,7 +2884,7 @@
             </a:ln>
             <a:extLst>
               <a:ext uri="{91240B29-F687-4f45-9708-019B960494DF}">
-                <a14:hiddenLine xmlns="" xmlns:a14="http://schemas.microsoft.com/office/drawing/2010/main" w="9525">
+                <a14:hiddenLine xmlns:a14="http://schemas.microsoft.com/office/drawing/2010/main" xmlns="" w="9525">
                   <a:solidFill>
                     <a:srgbClr val="000000"/>
                   </a:solidFill>
@@ -2946,7 +2946,7 @@
             </a:ln>
             <a:extLst>
               <a:ext uri="{91240B29-F687-4f45-9708-019B960494DF}">
-                <a14:hiddenLine xmlns="" xmlns:a14="http://schemas.microsoft.com/office/drawing/2010/main" w="9525">
+                <a14:hiddenLine xmlns:a14="http://schemas.microsoft.com/office/drawing/2010/main" xmlns="" w="9525">
                   <a:solidFill>
                     <a:srgbClr val="000000"/>
                   </a:solidFill>
@@ -3036,7 +3036,7 @@
             </a:ln>
             <a:extLst>
               <a:ext uri="{91240B29-F687-4f45-9708-019B960494DF}">
-                <a14:hiddenLine xmlns="" xmlns:a14="http://schemas.microsoft.com/office/drawing/2010/main" w="9525">
+                <a14:hiddenLine xmlns:a14="http://schemas.microsoft.com/office/drawing/2010/main" xmlns="" w="9525">
                   <a:solidFill>
                     <a:srgbClr val="000000"/>
                   </a:solidFill>
@@ -3098,7 +3098,7 @@
             </a:ln>
             <a:extLst>
               <a:ext uri="{91240B29-F687-4f45-9708-019B960494DF}">
-                <a14:hiddenLine xmlns="" xmlns:a14="http://schemas.microsoft.com/office/drawing/2010/main" w="9525">
+                <a14:hiddenLine xmlns:a14="http://schemas.microsoft.com/office/drawing/2010/main" xmlns="" w="9525">
                   <a:solidFill>
                     <a:srgbClr val="000000"/>
                   </a:solidFill>
@@ -3188,7 +3188,7 @@
             </a:ln>
             <a:extLst>
               <a:ext uri="{91240B29-F687-4f45-9708-019B960494DF}">
-                <a14:hiddenLine xmlns="" xmlns:a14="http://schemas.microsoft.com/office/drawing/2010/main" w="9525">
+                <a14:hiddenLine xmlns:a14="http://schemas.microsoft.com/office/drawing/2010/main" xmlns="" w="9525">
                   <a:solidFill>
                     <a:srgbClr val="000000"/>
                   </a:solidFill>
@@ -3222,7 +3222,7 @@
             </a:ln>
             <a:extLst>
               <a:ext uri="{91240B29-F687-4f45-9708-019B960494DF}">
-                <a14:hiddenLine xmlns="" xmlns:a14="http://schemas.microsoft.com/office/drawing/2010/main" w="9525">
+                <a14:hiddenLine xmlns:a14="http://schemas.microsoft.com/office/drawing/2010/main" xmlns="" w="9525">
                   <a:solidFill>
                     <a:srgbClr val="000000"/>
                   </a:solidFill>
@@ -3287,7 +3287,7 @@
             </a:ln>
             <a:extLst>
               <a:ext uri="{91240B29-F687-4f45-9708-019B960494DF}">
-                <a14:hiddenLine xmlns="" xmlns:a14="http://schemas.microsoft.com/office/drawing/2010/main" w="9525">
+                <a14:hiddenLine xmlns:a14="http://schemas.microsoft.com/office/drawing/2010/main" xmlns="" w="9525">
                   <a:solidFill>
                     <a:srgbClr val="000000"/>
                   </a:solidFill>
@@ -3377,7 +3377,7 @@
             </a:ln>
             <a:extLst>
               <a:ext uri="{91240B29-F687-4f45-9708-019B960494DF}">
-                <a14:hiddenLine xmlns="" xmlns:a14="http://schemas.microsoft.com/office/drawing/2010/main" w="9525">
+                <a14:hiddenLine xmlns:a14="http://schemas.microsoft.com/office/drawing/2010/main" xmlns="" w="9525">
                   <a:solidFill>
                     <a:srgbClr val="000000"/>
                   </a:solidFill>
@@ -3439,7 +3439,7 @@
             </a:ln>
             <a:extLst>
               <a:ext uri="{91240B29-F687-4f45-9708-019B960494DF}">
-                <a14:hiddenLine xmlns="" xmlns:a14="http://schemas.microsoft.com/office/drawing/2010/main" w="9525">
+                <a14:hiddenLine xmlns:a14="http://schemas.microsoft.com/office/drawing/2010/main" xmlns="" w="9525">
                   <a:solidFill>
                     <a:srgbClr val="000000"/>
                   </a:solidFill>
@@ -3529,7 +3529,7 @@
             </a:ln>
             <a:extLst>
               <a:ext uri="{91240B29-F687-4f45-9708-019B960494DF}">
-                <a14:hiddenLine xmlns="" xmlns:a14="http://schemas.microsoft.com/office/drawing/2010/main" w="9525">
+                <a14:hiddenLine xmlns:a14="http://schemas.microsoft.com/office/drawing/2010/main" xmlns="" w="9525">
                   <a:solidFill>
                     <a:srgbClr val="000000"/>
                   </a:solidFill>
@@ -3619,7 +3619,7 @@
             </a:ln>
             <a:extLst>
               <a:ext uri="{91240B29-F687-4f45-9708-019B960494DF}">
-                <a14:hiddenLine xmlns="" xmlns:a14="http://schemas.microsoft.com/office/drawing/2010/main" w="9525">
+                <a14:hiddenLine xmlns:a14="http://schemas.microsoft.com/office/drawing/2010/main" xmlns="" w="9525">
                   <a:solidFill>
                     <a:srgbClr val="000000"/>
                   </a:solidFill>
@@ -3684,7 +3684,7 @@
             </a:ln>
             <a:extLst>
               <a:ext uri="{91240B29-F687-4f45-9708-019B960494DF}">
-                <a14:hiddenLine xmlns="" xmlns:a14="http://schemas.microsoft.com/office/drawing/2010/main" w="9525">
+                <a14:hiddenLine xmlns:a14="http://schemas.microsoft.com/office/drawing/2010/main" xmlns="" w="9525">
                   <a:solidFill>
                     <a:srgbClr val="000000"/>
                   </a:solidFill>
@@ -3746,7 +3746,7 @@
             </a:ln>
             <a:extLst>
               <a:ext uri="{91240B29-F687-4f45-9708-019B960494DF}">
-                <a14:hiddenLine xmlns="" xmlns:a14="http://schemas.microsoft.com/office/drawing/2010/main" w="9525">
+                <a14:hiddenLine xmlns:a14="http://schemas.microsoft.com/office/drawing/2010/main" xmlns="" w="9525">
                   <a:solidFill>
                     <a:srgbClr val="000000"/>
                   </a:solidFill>
@@ -3836,7 +3836,7 @@
             </a:ln>
             <a:extLst>
               <a:ext uri="{91240B29-F687-4f45-9708-019B960494DF}">
-                <a14:hiddenLine xmlns="" xmlns:a14="http://schemas.microsoft.com/office/drawing/2010/main" w="9525">
+                <a14:hiddenLine xmlns:a14="http://schemas.microsoft.com/office/drawing/2010/main" xmlns="" w="9525">
                   <a:solidFill>
                     <a:srgbClr val="000000"/>
                   </a:solidFill>
@@ -3926,7 +3926,7 @@
             </a:ln>
             <a:extLst>
               <a:ext uri="{91240B29-F687-4f45-9708-019B960494DF}">
-                <a14:hiddenLine xmlns="" xmlns:a14="http://schemas.microsoft.com/office/drawing/2010/main" w="9525">
+                <a14:hiddenLine xmlns:a14="http://schemas.microsoft.com/office/drawing/2010/main" xmlns="" w="9525">
                   <a:solidFill>
                     <a:srgbClr val="000000"/>
                   </a:solidFill>
@@ -3988,7 +3988,7 @@
             </a:ln>
             <a:extLst>
               <a:ext uri="{91240B29-F687-4f45-9708-019B960494DF}">
-                <a14:hiddenLine xmlns="" xmlns:a14="http://schemas.microsoft.com/office/drawing/2010/main" w="9525">
+                <a14:hiddenLine xmlns:a14="http://schemas.microsoft.com/office/drawing/2010/main" xmlns="" w="9525">
                   <a:solidFill>
                     <a:srgbClr val="000000"/>
                   </a:solidFill>
@@ -4108,7 +4108,7 @@
             </a:ln>
             <a:extLst>
               <a:ext uri="{91240B29-F687-4f45-9708-019B960494DF}">
-                <a14:hiddenLine xmlns="" xmlns:a14="http://schemas.microsoft.com/office/drawing/2010/main" w="9525">
+                <a14:hiddenLine xmlns:a14="http://schemas.microsoft.com/office/drawing/2010/main" xmlns="" w="9525">
                   <a:solidFill>
                     <a:srgbClr val="000000"/>
                   </a:solidFill>
@@ -4176,7 +4176,7 @@
             </a:ln>
             <a:extLst>
               <a:ext uri="{91240B29-F687-4f45-9708-019B960494DF}">
-                <a14:hiddenLine xmlns="" xmlns:a14="http://schemas.microsoft.com/office/drawing/2010/main" w="9525">
+                <a14:hiddenLine xmlns:a14="http://schemas.microsoft.com/office/drawing/2010/main" xmlns="" w="9525">
                   <a:solidFill>
                     <a:srgbClr val="000000"/>
                   </a:solidFill>
@@ -4266,7 +4266,7 @@
             </a:ln>
             <a:extLst>
               <a:ext uri="{91240B29-F687-4f45-9708-019B960494DF}">
-                <a14:hiddenLine xmlns="" xmlns:a14="http://schemas.microsoft.com/office/drawing/2010/main" w="9525">
+                <a14:hiddenLine xmlns:a14="http://schemas.microsoft.com/office/drawing/2010/main" xmlns="" w="9525">
                   <a:solidFill>
                     <a:srgbClr val="000000"/>
                   </a:solidFill>
@@ -4406,7 +4406,7 @@
           <a:p>
             <a:fld id="{A62A73B7-E90B-4A8D-BCEB-7DB01CEED5BE}" type="datetimeFigureOut">
               <a:rPr lang="en-IN" smtClean="0"/>
-              <a:t>14-02-2022</a:t>
+              <a:t>15-02-2022</a:t>
             </a:fld>
             <a:endParaRPr lang="en-IN"/>
           </a:p>
@@ -4673,7 +4673,7 @@
           <a:p>
             <a:fld id="{A62A73B7-E90B-4A8D-BCEB-7DB01CEED5BE}" type="datetimeFigureOut">
               <a:rPr lang="en-IN" smtClean="0"/>
-              <a:t>14-02-2022</a:t>
+              <a:t>15-02-2022</a:t>
             </a:fld>
             <a:endParaRPr lang="en-IN"/>
           </a:p>
@@ -4869,7 +4869,7 @@
           <a:p>
             <a:fld id="{A62A73B7-E90B-4A8D-BCEB-7DB01CEED5BE}" type="datetimeFigureOut">
               <a:rPr lang="en-IN" smtClean="0"/>
-              <a:t>14-02-2022</a:t>
+              <a:t>15-02-2022</a:t>
             </a:fld>
             <a:endParaRPr lang="en-IN"/>
           </a:p>
@@ -5132,7 +5132,7 @@
           <a:p>
             <a:fld id="{A62A73B7-E90B-4A8D-BCEB-7DB01CEED5BE}" type="datetimeFigureOut">
               <a:rPr lang="en-IN" smtClean="0"/>
-              <a:t>14-02-2022</a:t>
+              <a:t>15-02-2022</a:t>
             </a:fld>
             <a:endParaRPr lang="en-IN"/>
           </a:p>
@@ -5566,7 +5566,7 @@
           <a:p>
             <a:fld id="{A62A73B7-E90B-4A8D-BCEB-7DB01CEED5BE}" type="datetimeFigureOut">
               <a:rPr lang="en-IN" smtClean="0"/>
-              <a:t>14-02-2022</a:t>
+              <a:t>15-02-2022</a:t>
             </a:fld>
             <a:endParaRPr lang="en-IN"/>
           </a:p>
@@ -6112,7 +6112,7 @@
           <a:p>
             <a:fld id="{A62A73B7-E90B-4A8D-BCEB-7DB01CEED5BE}" type="datetimeFigureOut">
               <a:rPr lang="en-IN" smtClean="0"/>
-              <a:t>14-02-2022</a:t>
+              <a:t>15-02-2022</a:t>
             </a:fld>
             <a:endParaRPr lang="en-IN"/>
           </a:p>
@@ -6832,7 +6832,7 @@
           <a:p>
             <a:fld id="{A62A73B7-E90B-4A8D-BCEB-7DB01CEED5BE}" type="datetimeFigureOut">
               <a:rPr lang="en-IN" smtClean="0"/>
-              <a:t>14-02-2022</a:t>
+              <a:t>15-02-2022</a:t>
             </a:fld>
             <a:endParaRPr lang="en-IN"/>
           </a:p>
@@ -7002,7 +7002,7 @@
           <a:p>
             <a:fld id="{A62A73B7-E90B-4A8D-BCEB-7DB01CEED5BE}" type="datetimeFigureOut">
               <a:rPr lang="en-IN" smtClean="0"/>
-              <a:t>14-02-2022</a:t>
+              <a:t>15-02-2022</a:t>
             </a:fld>
             <a:endParaRPr lang="en-IN"/>
           </a:p>
@@ -7182,7 +7182,7 @@
           <a:p>
             <a:fld id="{A62A73B7-E90B-4A8D-BCEB-7DB01CEED5BE}" type="datetimeFigureOut">
               <a:rPr lang="en-IN" smtClean="0"/>
-              <a:t>14-02-2022</a:t>
+              <a:t>15-02-2022</a:t>
             </a:fld>
             <a:endParaRPr lang="en-IN"/>
           </a:p>
@@ -7352,7 +7352,7 @@
           <a:p>
             <a:fld id="{A62A73B7-E90B-4A8D-BCEB-7DB01CEED5BE}" type="datetimeFigureOut">
               <a:rPr lang="en-IN" smtClean="0"/>
-              <a:t>14-02-2022</a:t>
+              <a:t>15-02-2022</a:t>
             </a:fld>
             <a:endParaRPr lang="en-IN"/>
           </a:p>
@@ -7602,7 +7602,7 @@
           <a:p>
             <a:fld id="{A62A73B7-E90B-4A8D-BCEB-7DB01CEED5BE}" type="datetimeFigureOut">
               <a:rPr lang="en-IN" smtClean="0"/>
-              <a:t>14-02-2022</a:t>
+              <a:t>15-02-2022</a:t>
             </a:fld>
             <a:endParaRPr lang="en-IN"/>
           </a:p>
@@ -7834,7 +7834,7 @@
           <a:p>
             <a:fld id="{A62A73B7-E90B-4A8D-BCEB-7DB01CEED5BE}" type="datetimeFigureOut">
               <a:rPr lang="en-IN" smtClean="0"/>
-              <a:t>14-02-2022</a:t>
+              <a:t>15-02-2022</a:t>
             </a:fld>
             <a:endParaRPr lang="en-IN"/>
           </a:p>
@@ -8215,7 +8215,7 @@
           <a:p>
             <a:fld id="{A62A73B7-E90B-4A8D-BCEB-7DB01CEED5BE}" type="datetimeFigureOut">
               <a:rPr lang="en-IN" smtClean="0"/>
-              <a:t>14-02-2022</a:t>
+              <a:t>15-02-2022</a:t>
             </a:fld>
             <a:endParaRPr lang="en-IN"/>
           </a:p>
@@ -8333,7 +8333,7 @@
           <a:p>
             <a:fld id="{A62A73B7-E90B-4A8D-BCEB-7DB01CEED5BE}" type="datetimeFigureOut">
               <a:rPr lang="en-IN" smtClean="0"/>
-              <a:t>14-02-2022</a:t>
+              <a:t>15-02-2022</a:t>
             </a:fld>
             <a:endParaRPr lang="en-IN"/>
           </a:p>
@@ -8428,7 +8428,7 @@
           <a:p>
             <a:fld id="{A62A73B7-E90B-4A8D-BCEB-7DB01CEED5BE}" type="datetimeFigureOut">
               <a:rPr lang="en-IN" smtClean="0"/>
-              <a:t>14-02-2022</a:t>
+              <a:t>15-02-2022</a:t>
             </a:fld>
             <a:endParaRPr lang="en-IN"/>
           </a:p>
@@ -8677,7 +8677,7 @@
           <a:p>
             <a:fld id="{A62A73B7-E90B-4A8D-BCEB-7DB01CEED5BE}" type="datetimeFigureOut">
               <a:rPr lang="en-IN" smtClean="0"/>
-              <a:t>14-02-2022</a:t>
+              <a:t>15-02-2022</a:t>
             </a:fld>
             <a:endParaRPr lang="en-IN"/>
           </a:p>
@@ -8957,7 +8957,7 @@
           <a:p>
             <a:fld id="{A62A73B7-E90B-4A8D-BCEB-7DB01CEED5BE}" type="datetimeFigureOut">
               <a:rPr lang="en-IN" smtClean="0"/>
-              <a:t>14-02-2022</a:t>
+              <a:t>15-02-2022</a:t>
             </a:fld>
             <a:endParaRPr lang="en-IN"/>
           </a:p>
@@ -9080,7 +9080,7 @@
           <a:noFill/>
           <a:extLst>
             <a:ext uri="{909E8E84-426E-40dd-AFC4-6F175D3DCCD1}">
-              <a14:hiddenFill xmlns="" xmlns:a14="http://schemas.microsoft.com/office/drawing/2010/main">
+              <a14:hiddenFill xmlns:a14="http://schemas.microsoft.com/office/drawing/2010/main" xmlns="">
                 <a:solidFill>
                   <a:srgbClr val="FFFFFF"/>
                 </a:solidFill>
@@ -9154,7 +9154,7 @@
               </a:ln>
               <a:extLst>
                 <a:ext uri="{91240B29-F687-4f45-9708-019B960494DF}">
-                  <a14:hiddenLine xmlns="" xmlns:a14="http://schemas.microsoft.com/office/drawing/2010/main" w="9525">
+                  <a14:hiddenLine xmlns:a14="http://schemas.microsoft.com/office/drawing/2010/main" xmlns="" w="9525">
                     <a:solidFill>
                       <a:srgbClr val="000000"/>
                     </a:solidFill>
@@ -9244,7 +9244,7 @@
               </a:ln>
               <a:extLst>
                 <a:ext uri="{91240B29-F687-4f45-9708-019B960494DF}">
-                  <a14:hiddenLine xmlns="" xmlns:a14="http://schemas.microsoft.com/office/drawing/2010/main" w="9525">
+                  <a14:hiddenLine xmlns:a14="http://schemas.microsoft.com/office/drawing/2010/main" xmlns="" w="9525">
                     <a:solidFill>
                       <a:srgbClr val="000000"/>
                     </a:solidFill>
@@ -9334,7 +9334,7 @@
               </a:ln>
               <a:extLst>
                 <a:ext uri="{91240B29-F687-4f45-9708-019B960494DF}">
-                  <a14:hiddenLine xmlns="" xmlns:a14="http://schemas.microsoft.com/office/drawing/2010/main" w="9525">
+                  <a14:hiddenLine xmlns:a14="http://schemas.microsoft.com/office/drawing/2010/main" xmlns="" w="9525">
                     <a:solidFill>
                       <a:srgbClr val="000000"/>
                     </a:solidFill>
@@ -9396,7 +9396,7 @@
               </a:ln>
               <a:extLst>
                 <a:ext uri="{91240B29-F687-4f45-9708-019B960494DF}">
-                  <a14:hiddenLine xmlns="" xmlns:a14="http://schemas.microsoft.com/office/drawing/2010/main" w="9525">
+                  <a14:hiddenLine xmlns:a14="http://schemas.microsoft.com/office/drawing/2010/main" xmlns="" w="9525">
                     <a:solidFill>
                       <a:srgbClr val="000000"/>
                     </a:solidFill>
@@ -9486,7 +9486,7 @@
               </a:ln>
               <a:extLst>
                 <a:ext uri="{91240B29-F687-4f45-9708-019B960494DF}">
-                  <a14:hiddenLine xmlns="" xmlns:a14="http://schemas.microsoft.com/office/drawing/2010/main" w="9525">
+                  <a14:hiddenLine xmlns:a14="http://schemas.microsoft.com/office/drawing/2010/main" xmlns="" w="9525">
                     <a:solidFill>
                       <a:srgbClr val="000000"/>
                     </a:solidFill>
@@ -9548,7 +9548,7 @@
               </a:ln>
               <a:extLst>
                 <a:ext uri="{91240B29-F687-4f45-9708-019B960494DF}">
-                  <a14:hiddenLine xmlns="" xmlns:a14="http://schemas.microsoft.com/office/drawing/2010/main" w="9525">
+                  <a14:hiddenLine xmlns:a14="http://schemas.microsoft.com/office/drawing/2010/main" xmlns="" w="9525">
                     <a:solidFill>
                       <a:srgbClr val="000000"/>
                     </a:solidFill>
@@ -9610,7 +9610,7 @@
               </a:ln>
               <a:extLst>
                 <a:ext uri="{91240B29-F687-4f45-9708-019B960494DF}">
-                  <a14:hiddenLine xmlns="" xmlns:a14="http://schemas.microsoft.com/office/drawing/2010/main" w="9525">
+                  <a14:hiddenLine xmlns:a14="http://schemas.microsoft.com/office/drawing/2010/main" xmlns="" w="9525">
                     <a:solidFill>
                       <a:srgbClr val="000000"/>
                     </a:solidFill>
@@ -9700,7 +9700,7 @@
               </a:ln>
               <a:extLst>
                 <a:ext uri="{91240B29-F687-4f45-9708-019B960494DF}">
-                  <a14:hiddenLine xmlns="" xmlns:a14="http://schemas.microsoft.com/office/drawing/2010/main" w="9525">
+                  <a14:hiddenLine xmlns:a14="http://schemas.microsoft.com/office/drawing/2010/main" xmlns="" w="9525">
                     <a:solidFill>
                       <a:srgbClr val="000000"/>
                     </a:solidFill>
@@ -9790,7 +9790,7 @@
               </a:ln>
               <a:extLst>
                 <a:ext uri="{91240B29-F687-4f45-9708-019B960494DF}">
-                  <a14:hiddenLine xmlns="" xmlns:a14="http://schemas.microsoft.com/office/drawing/2010/main" w="9525">
+                  <a14:hiddenLine xmlns:a14="http://schemas.microsoft.com/office/drawing/2010/main" xmlns="" w="9525">
                     <a:solidFill>
                       <a:srgbClr val="000000"/>
                     </a:solidFill>
@@ -9852,7 +9852,7 @@
               </a:ln>
               <a:extLst>
                 <a:ext uri="{91240B29-F687-4f45-9708-019B960494DF}">
-                  <a14:hiddenLine xmlns="" xmlns:a14="http://schemas.microsoft.com/office/drawing/2010/main" w="9525">
+                  <a14:hiddenLine xmlns:a14="http://schemas.microsoft.com/office/drawing/2010/main" xmlns="" w="9525">
                     <a:solidFill>
                       <a:srgbClr val="000000"/>
                     </a:solidFill>
@@ -9962,7 +9962,7 @@
               </a:ln>
               <a:extLst>
                 <a:ext uri="{91240B29-F687-4f45-9708-019B960494DF}">
-                  <a14:hiddenLine xmlns="" xmlns:a14="http://schemas.microsoft.com/office/drawing/2010/main" w="9525">
+                  <a14:hiddenLine xmlns:a14="http://schemas.microsoft.com/office/drawing/2010/main" xmlns="" w="9525">
                     <a:solidFill>
                       <a:srgbClr val="000000"/>
                     </a:solidFill>
@@ -10046,7 +10046,7 @@
               </a:ln>
               <a:extLst>
                 <a:ext uri="{91240B29-F687-4f45-9708-019B960494DF}">
-                  <a14:hiddenLine xmlns="" xmlns:a14="http://schemas.microsoft.com/office/drawing/2010/main" w="9525">
+                  <a14:hiddenLine xmlns:a14="http://schemas.microsoft.com/office/drawing/2010/main" xmlns="" w="9525">
                     <a:solidFill>
                       <a:srgbClr val="000000"/>
                     </a:solidFill>
@@ -10108,7 +10108,7 @@
               </a:ln>
               <a:extLst>
                 <a:ext uri="{91240B29-F687-4f45-9708-019B960494DF}">
-                  <a14:hiddenLine xmlns="" xmlns:a14="http://schemas.microsoft.com/office/drawing/2010/main" w="9525">
+                  <a14:hiddenLine xmlns:a14="http://schemas.microsoft.com/office/drawing/2010/main" xmlns="" w="9525">
                     <a:solidFill>
                       <a:srgbClr val="000000"/>
                     </a:solidFill>
@@ -10170,7 +10170,7 @@
               </a:ln>
               <a:extLst>
                 <a:ext uri="{91240B29-F687-4f45-9708-019B960494DF}">
-                  <a14:hiddenLine xmlns="" xmlns:a14="http://schemas.microsoft.com/office/drawing/2010/main" w="9525">
+                  <a14:hiddenLine xmlns:a14="http://schemas.microsoft.com/office/drawing/2010/main" xmlns="" w="9525">
                     <a:solidFill>
                       <a:srgbClr val="000000"/>
                     </a:solidFill>
@@ -10260,7 +10260,7 @@
               </a:ln>
               <a:extLst>
                 <a:ext uri="{91240B29-F687-4f45-9708-019B960494DF}">
-                  <a14:hiddenLine xmlns="" xmlns:a14="http://schemas.microsoft.com/office/drawing/2010/main" w="9525">
+                  <a14:hiddenLine xmlns:a14="http://schemas.microsoft.com/office/drawing/2010/main" xmlns="" w="9525">
                     <a:solidFill>
                       <a:srgbClr val="000000"/>
                     </a:solidFill>
@@ -10294,7 +10294,7 @@
               </a:ln>
               <a:extLst>
                 <a:ext uri="{91240B29-F687-4f45-9708-019B960494DF}">
-                  <a14:hiddenLine xmlns="" xmlns:a14="http://schemas.microsoft.com/office/drawing/2010/main" w="9525">
+                  <a14:hiddenLine xmlns:a14="http://schemas.microsoft.com/office/drawing/2010/main" xmlns="" w="9525">
                     <a:solidFill>
                       <a:srgbClr val="000000"/>
                     </a:solidFill>
@@ -10359,7 +10359,7 @@
               </a:ln>
               <a:extLst>
                 <a:ext uri="{91240B29-F687-4f45-9708-019B960494DF}">
-                  <a14:hiddenLine xmlns="" xmlns:a14="http://schemas.microsoft.com/office/drawing/2010/main" w="9525">
+                  <a14:hiddenLine xmlns:a14="http://schemas.microsoft.com/office/drawing/2010/main" xmlns="" w="9525">
                     <a:solidFill>
                       <a:srgbClr val="000000"/>
                     </a:solidFill>
@@ -10449,7 +10449,7 @@
               </a:ln>
               <a:extLst>
                 <a:ext uri="{91240B29-F687-4f45-9708-019B960494DF}">
-                  <a14:hiddenLine xmlns="" xmlns:a14="http://schemas.microsoft.com/office/drawing/2010/main" w="9525">
+                  <a14:hiddenLine xmlns:a14="http://schemas.microsoft.com/office/drawing/2010/main" xmlns="" w="9525">
                     <a:solidFill>
                       <a:srgbClr val="000000"/>
                     </a:solidFill>
@@ -10511,7 +10511,7 @@
               </a:ln>
               <a:extLst>
                 <a:ext uri="{91240B29-F687-4f45-9708-019B960494DF}">
-                  <a14:hiddenLine xmlns="" xmlns:a14="http://schemas.microsoft.com/office/drawing/2010/main" w="9525">
+                  <a14:hiddenLine xmlns:a14="http://schemas.microsoft.com/office/drawing/2010/main" xmlns="" w="9525">
                     <a:solidFill>
                       <a:srgbClr val="000000"/>
                     </a:solidFill>
@@ -10601,7 +10601,7 @@
               </a:ln>
               <a:extLst>
                 <a:ext uri="{91240B29-F687-4f45-9708-019B960494DF}">
-                  <a14:hiddenLine xmlns="" xmlns:a14="http://schemas.microsoft.com/office/drawing/2010/main" w="9525">
+                  <a14:hiddenLine xmlns:a14="http://schemas.microsoft.com/office/drawing/2010/main" xmlns="" w="9525">
                     <a:solidFill>
                       <a:srgbClr val="000000"/>
                     </a:solidFill>
@@ -10666,7 +10666,7 @@
               </a:ln>
               <a:extLst>
                 <a:ext uri="{91240B29-F687-4f45-9708-019B960494DF}">
-                  <a14:hiddenLine xmlns="" xmlns:a14="http://schemas.microsoft.com/office/drawing/2010/main" w="9525">
+                  <a14:hiddenLine xmlns:a14="http://schemas.microsoft.com/office/drawing/2010/main" xmlns="" w="9525">
                     <a:solidFill>
                       <a:srgbClr val="000000"/>
                     </a:solidFill>
@@ -10728,7 +10728,7 @@
               </a:ln>
               <a:extLst>
                 <a:ext uri="{91240B29-F687-4f45-9708-019B960494DF}">
-                  <a14:hiddenLine xmlns="" xmlns:a14="http://schemas.microsoft.com/office/drawing/2010/main" w="9525">
+                  <a14:hiddenLine xmlns:a14="http://schemas.microsoft.com/office/drawing/2010/main" xmlns="" w="9525">
                     <a:solidFill>
                       <a:srgbClr val="000000"/>
                     </a:solidFill>
@@ -10818,7 +10818,7 @@
               </a:ln>
               <a:extLst>
                 <a:ext uri="{91240B29-F687-4f45-9708-019B960494DF}">
-                  <a14:hiddenLine xmlns="" xmlns:a14="http://schemas.microsoft.com/office/drawing/2010/main" w="9525">
+                  <a14:hiddenLine xmlns:a14="http://schemas.microsoft.com/office/drawing/2010/main" xmlns="" w="9525">
                     <a:solidFill>
                       <a:srgbClr val="000000"/>
                     </a:solidFill>
@@ -10908,7 +10908,7 @@
               </a:ln>
               <a:extLst>
                 <a:ext uri="{91240B29-F687-4f45-9708-019B960494DF}">
-                  <a14:hiddenLine xmlns="" xmlns:a14="http://schemas.microsoft.com/office/drawing/2010/main" w="9525">
+                  <a14:hiddenLine xmlns:a14="http://schemas.microsoft.com/office/drawing/2010/main" xmlns="" w="9525">
                     <a:solidFill>
                       <a:srgbClr val="000000"/>
                     </a:solidFill>
@@ -10973,7 +10973,7 @@
               </a:ln>
               <a:extLst>
                 <a:ext uri="{91240B29-F687-4f45-9708-019B960494DF}">
-                  <a14:hiddenLine xmlns="" xmlns:a14="http://schemas.microsoft.com/office/drawing/2010/main" w="9525">
+                  <a14:hiddenLine xmlns:a14="http://schemas.microsoft.com/office/drawing/2010/main" xmlns="" w="9525">
                     <a:solidFill>
                       <a:srgbClr val="000000"/>
                     </a:solidFill>
@@ -11093,7 +11093,7 @@
               </a:ln>
               <a:extLst>
                 <a:ext uri="{91240B29-F687-4f45-9708-019B960494DF}">
-                  <a14:hiddenLine xmlns="" xmlns:a14="http://schemas.microsoft.com/office/drawing/2010/main" w="9525">
+                  <a14:hiddenLine xmlns:a14="http://schemas.microsoft.com/office/drawing/2010/main" xmlns="" w="9525">
                     <a:solidFill>
                       <a:srgbClr val="000000"/>
                     </a:solidFill>
@@ -11174,7 +11174,7 @@
               </a:ln>
               <a:extLst>
                 <a:ext uri="{91240B29-F687-4f45-9708-019B960494DF}">
-                  <a14:hiddenLine xmlns="" xmlns:a14="http://schemas.microsoft.com/office/drawing/2010/main" w="9525">
+                  <a14:hiddenLine xmlns:a14="http://schemas.microsoft.com/office/drawing/2010/main" xmlns="" w="9525">
                     <a:solidFill>
                       <a:srgbClr val="000000"/>
                     </a:solidFill>
@@ -11289,7 +11289,7 @@
               </a:ln>
               <a:extLst>
                 <a:ext uri="{91240B29-F687-4f45-9708-019B960494DF}">
-                  <a14:hiddenLine xmlns="" xmlns:a14="http://schemas.microsoft.com/office/drawing/2010/main" w="9525">
+                  <a14:hiddenLine xmlns:a14="http://schemas.microsoft.com/office/drawing/2010/main" xmlns="" w="9525">
                     <a:solidFill>
                       <a:srgbClr val="000000"/>
                     </a:solidFill>
@@ -11379,7 +11379,7 @@
               </a:ln>
               <a:extLst>
                 <a:ext uri="{91240B29-F687-4f45-9708-019B960494DF}">
-                  <a14:hiddenLine xmlns="" xmlns:a14="http://schemas.microsoft.com/office/drawing/2010/main" w="9525">
+                  <a14:hiddenLine xmlns:a14="http://schemas.microsoft.com/office/drawing/2010/main" xmlns="" w="9525">
                     <a:solidFill>
                       <a:srgbClr val="000000"/>
                     </a:solidFill>
@@ -11444,7 +11444,7 @@
               </a:ln>
               <a:extLst>
                 <a:ext uri="{91240B29-F687-4f45-9708-019B960494DF}">
-                  <a14:hiddenLine xmlns="" xmlns:a14="http://schemas.microsoft.com/office/drawing/2010/main" w="9525">
+                  <a14:hiddenLine xmlns:a14="http://schemas.microsoft.com/office/drawing/2010/main" xmlns="" w="9525">
                     <a:solidFill>
                       <a:srgbClr val="000000"/>
                     </a:solidFill>
@@ -11534,7 +11534,7 @@
               </a:ln>
               <a:extLst>
                 <a:ext uri="{91240B29-F687-4f45-9708-019B960494DF}">
-                  <a14:hiddenLine xmlns="" xmlns:a14="http://schemas.microsoft.com/office/drawing/2010/main" w="9525">
+                  <a14:hiddenLine xmlns:a14="http://schemas.microsoft.com/office/drawing/2010/main" xmlns="" w="9525">
                     <a:solidFill>
                       <a:srgbClr val="000000"/>
                     </a:solidFill>
@@ -11602,7 +11602,7 @@
               </a:ln>
               <a:extLst>
                 <a:ext uri="{91240B29-F687-4f45-9708-019B960494DF}">
-                  <a14:hiddenLine xmlns="" xmlns:a14="http://schemas.microsoft.com/office/drawing/2010/main" w="9525">
+                  <a14:hiddenLine xmlns:a14="http://schemas.microsoft.com/office/drawing/2010/main" xmlns="" w="9525">
                     <a:solidFill>
                       <a:srgbClr val="000000"/>
                     </a:solidFill>
@@ -11692,7 +11692,7 @@
               </a:ln>
               <a:extLst>
                 <a:ext uri="{91240B29-F687-4f45-9708-019B960494DF}">
-                  <a14:hiddenLine xmlns="" xmlns:a14="http://schemas.microsoft.com/office/drawing/2010/main" w="9525">
+                  <a14:hiddenLine xmlns:a14="http://schemas.microsoft.com/office/drawing/2010/main" xmlns="" w="9525">
                     <a:solidFill>
                       <a:srgbClr val="000000"/>
                     </a:solidFill>
@@ -11760,7 +11760,7 @@
               </a:ln>
               <a:extLst>
                 <a:ext uri="{91240B29-F687-4f45-9708-019B960494DF}">
-                  <a14:hiddenLine xmlns="" xmlns:a14="http://schemas.microsoft.com/office/drawing/2010/main" w="9525">
+                  <a14:hiddenLine xmlns:a14="http://schemas.microsoft.com/office/drawing/2010/main" xmlns="" w="9525">
                     <a:solidFill>
                       <a:srgbClr val="000000"/>
                     </a:solidFill>
@@ -11850,7 +11850,7 @@
               </a:ln>
               <a:extLst>
                 <a:ext uri="{91240B29-F687-4f45-9708-019B960494DF}">
-                  <a14:hiddenLine xmlns="" xmlns:a14="http://schemas.microsoft.com/office/drawing/2010/main" w="9525">
+                  <a14:hiddenLine xmlns:a14="http://schemas.microsoft.com/office/drawing/2010/main" xmlns="" w="9525">
                     <a:solidFill>
                       <a:srgbClr val="000000"/>
                     </a:solidFill>
@@ -11884,7 +11884,7 @@
               </a:ln>
               <a:extLst>
                 <a:ext uri="{91240B29-F687-4f45-9708-019B960494DF}">
-                  <a14:hiddenLine xmlns="" xmlns:a14="http://schemas.microsoft.com/office/drawing/2010/main" w="9525">
+                  <a14:hiddenLine xmlns:a14="http://schemas.microsoft.com/office/drawing/2010/main" xmlns="" w="9525">
                     <a:solidFill>
                       <a:srgbClr val="000000"/>
                     </a:solidFill>
@@ -12024,7 +12024,7 @@
           <a:p>
             <a:fld id="{A62A73B7-E90B-4A8D-BCEB-7DB01CEED5BE}" type="datetimeFigureOut">
               <a:rPr lang="en-IN" smtClean="0"/>
-              <a:t>14-02-2022</a:t>
+              <a:t>15-02-2022</a:t>
             </a:fld>
             <a:endParaRPr lang="en-IN"/>
           </a:p>
@@ -12458,7 +12458,7 @@
         </p:nvSpPr>
         <p:spPr>
           <a:xfrm>
-            <a:off x="2473343" y="2446450"/>
+            <a:off x="2679531" y="107150"/>
             <a:ext cx="8126963" cy="1107996"/>
           </a:xfrm>
           <a:prstGeom prst="rect">
@@ -12473,7 +12473,12 @@
           <a:lstStyle/>
           <a:p>
             <a:r>
-              <a:rPr lang="en-IN" sz="6600" dirty="0">
+              <a:rPr lang="en-IN" sz="6600" u="sng" dirty="0">
+                <a:solidFill>
+                  <a:schemeClr val="tx2">
+                    <a:lumMod val="90000"/>
+                  </a:schemeClr>
+                </a:solidFill>
                 <a:latin typeface="Algerian" panose="04020705040A02060702" pitchFamily="82" charset="0"/>
               </a:rPr>
               <a:t>Josephus problem</a:t>
@@ -12495,8 +12500,8 @@
         </p:nvSpPr>
         <p:spPr>
           <a:xfrm>
-            <a:off x="7935686" y="4758898"/>
-            <a:ext cx="3853542" cy="1631216"/>
+            <a:off x="8114980" y="5063698"/>
+            <a:ext cx="3853542" cy="1477328"/>
           </a:xfrm>
           <a:prstGeom prst="rect">
             <a:avLst/>
@@ -12511,39 +12516,70 @@
           <a:p>
             <a:pPr algn="r"/>
             <a:r>
-              <a:rPr lang="en-US" sz="2800" dirty="0"/>
+              <a:rPr lang="en-US" dirty="0">
+                <a:solidFill>
+                  <a:schemeClr val="accent1">
+                    <a:lumMod val="60000"/>
+                    <a:lumOff val="40000"/>
+                  </a:schemeClr>
+                </a:solidFill>
+              </a:rPr>
               <a:t>Team:</a:t>
             </a:r>
           </a:p>
           <a:p>
             <a:pPr algn="r"/>
             <a:r>
-              <a:rPr lang="en-US" dirty="0"/>
+              <a:rPr lang="en-US" dirty="0">
+                <a:solidFill>
+                  <a:schemeClr val="accent1">
+                    <a:lumMod val="60000"/>
+                    <a:lumOff val="40000"/>
+                  </a:schemeClr>
+                </a:solidFill>
+              </a:rPr>
               <a:t>Kumar Aashish Raj</a:t>
             </a:r>
           </a:p>
           <a:p>
             <a:pPr algn="r"/>
             <a:r>
-              <a:rPr lang="en-US" dirty="0"/>
+              <a:rPr lang="en-US" dirty="0">
+                <a:solidFill>
+                  <a:schemeClr val="accent1">
+                    <a:lumMod val="60000"/>
+                    <a:lumOff val="40000"/>
+                  </a:schemeClr>
+                </a:solidFill>
+              </a:rPr>
               <a:t>Md. Akhtar Ali</a:t>
             </a:r>
           </a:p>
           <a:p>
             <a:pPr algn="r"/>
             <a:r>
-              <a:rPr lang="en-US" dirty="0" err="1"/>
-              <a:t>Ayushmaan</a:t>
-            </a:r>
-            <a:r>
-              <a:rPr lang="en-US" dirty="0"/>
-              <a:t> Sinha</a:t>
+              <a:rPr lang="en-US" dirty="0">
+                <a:solidFill>
+                  <a:schemeClr val="accent1">
+                    <a:lumMod val="60000"/>
+                    <a:lumOff val="40000"/>
+                  </a:schemeClr>
+                </a:solidFill>
+              </a:rPr>
+              <a:t>Ayushman Sinha</a:t>
             </a:r>
           </a:p>
           <a:p>
             <a:pPr algn="r"/>
             <a:r>
-              <a:rPr lang="en-US" dirty="0"/>
+              <a:rPr lang="en-US" dirty="0">
+                <a:solidFill>
+                  <a:schemeClr val="accent1">
+                    <a:lumMod val="60000"/>
+                    <a:lumOff val="40000"/>
+                  </a:schemeClr>
+                </a:solidFill>
+              </a:rPr>
               <a:t>Shreyanshu Shubham</a:t>
             </a:r>
           </a:p>
@@ -12563,8 +12599,8 @@
         </p:nvSpPr>
         <p:spPr>
           <a:xfrm>
-            <a:off x="2683283" y="4758898"/>
-            <a:ext cx="3853542" cy="800219"/>
+            <a:off x="2225169" y="5186047"/>
+            <a:ext cx="1665514" cy="646331"/>
           </a:xfrm>
           <a:prstGeom prst="rect">
             <a:avLst/>
@@ -12578,14 +12614,161 @@
           <a:lstStyle/>
           <a:p>
             <a:r>
-              <a:rPr lang="en-US" sz="2800" dirty="0"/>
+              <a:rPr lang="en-US" dirty="0">
+                <a:solidFill>
+                  <a:schemeClr val="accent1">
+                    <a:lumMod val="60000"/>
+                    <a:lumOff val="40000"/>
+                  </a:schemeClr>
+                </a:solidFill>
+              </a:rPr>
               <a:t>Teacher:</a:t>
             </a:r>
           </a:p>
           <a:p>
             <a:r>
-              <a:rPr lang="en-US" dirty="0"/>
+              <a:rPr lang="en-US" dirty="0">
+                <a:solidFill>
+                  <a:schemeClr val="accent1">
+                    <a:lumMod val="60000"/>
+                    <a:lumOff val="40000"/>
+                  </a:schemeClr>
+                </a:solidFill>
+              </a:rPr>
               <a:t>Sharmila KP</a:t>
+            </a:r>
+          </a:p>
+        </p:txBody>
+      </p:sp>
+      <p:sp>
+        <p:nvSpPr>
+          <p:cNvPr id="2" name="TextBox 1">
+            <a:extLst>
+              <a:ext uri="{FF2B5EF4-FFF2-40B4-BE49-F238E27FC236}">
+                <a16:creationId xmlns:a16="http://schemas.microsoft.com/office/drawing/2014/main" id="{EFB297B6-3849-4BAD-B644-28F2000525FB}"/>
+              </a:ext>
+            </a:extLst>
+          </p:cNvPr>
+          <p:cNvSpPr txBox="1"/>
+          <p:nvPr/>
+        </p:nvSpPr>
+        <p:spPr>
+          <a:xfrm>
+            <a:off x="3980329" y="1455875"/>
+            <a:ext cx="5620871" cy="461665"/>
+          </a:xfrm>
+          <a:prstGeom prst="rect">
+            <a:avLst/>
+          </a:prstGeom>
+          <a:noFill/>
+        </p:spPr>
+        <p:txBody>
+          <a:bodyPr wrap="square" rtlCol="0">
+            <a:spAutoFit/>
+          </a:bodyPr>
+          <a:lstStyle/>
+          <a:p>
+            <a:r>
+              <a:rPr lang="en-IN" sz="2400" b="1" dirty="0">
+                <a:latin typeface="MV Boli" panose="02000500030200090000" pitchFamily="2" charset="0"/>
+                <a:cs typeface="MV Boli" panose="02000500030200090000" pitchFamily="2" charset="0"/>
+              </a:rPr>
+              <a:t>Named After a Jewish Historian, </a:t>
+            </a:r>
+          </a:p>
+        </p:txBody>
+      </p:sp>
+      <p:pic>
+        <p:nvPicPr>
+          <p:cNvPr id="4" name="Picture 3">
+            <a:extLst>
+              <a:ext uri="{FF2B5EF4-FFF2-40B4-BE49-F238E27FC236}">
+                <a16:creationId xmlns:a16="http://schemas.microsoft.com/office/drawing/2014/main" id="{DDAEAC2F-D6B7-45B1-9858-4B5D976A64E4}"/>
+              </a:ext>
+            </a:extLst>
+          </p:cNvPr>
+          <p:cNvPicPr>
+            <a:picLocks noChangeAspect="1"/>
+          </p:cNvPicPr>
+          <p:nvPr/>
+        </p:nvPicPr>
+        <p:blipFill>
+          <a:blip r:embed="rId2">
+            <a:extLst>
+              <a:ext uri="{28A0092B-C50C-407E-A947-70E740481C1C}">
+                <a14:useLocalDpi xmlns:a14="http://schemas.microsoft.com/office/drawing/2010/main" val="0"/>
+              </a:ext>
+            </a:extLst>
+          </a:blip>
+          <a:stretch>
+            <a:fillRect/>
+          </a:stretch>
+        </p:blipFill>
+        <p:spPr>
+          <a:xfrm>
+            <a:off x="5160905" y="2186907"/>
+            <a:ext cx="2372770" cy="3022921"/>
+          </a:xfrm>
+          <a:prstGeom prst="rect">
+            <a:avLst/>
+          </a:prstGeom>
+        </p:spPr>
+      </p:pic>
+      <p:sp>
+        <p:nvSpPr>
+          <p:cNvPr id="5" name="TextBox 4">
+            <a:extLst>
+              <a:ext uri="{FF2B5EF4-FFF2-40B4-BE49-F238E27FC236}">
+                <a16:creationId xmlns:a16="http://schemas.microsoft.com/office/drawing/2014/main" id="{C3EA0E17-1A3F-4B7D-85F7-092BF74D9783}"/>
+              </a:ext>
+            </a:extLst>
+          </p:cNvPr>
+          <p:cNvSpPr txBox="1"/>
+          <p:nvPr/>
+        </p:nvSpPr>
+        <p:spPr>
+          <a:xfrm>
+            <a:off x="5341582" y="5209828"/>
+            <a:ext cx="2635624" cy="369332"/>
+          </a:xfrm>
+          <a:prstGeom prst="rect">
+            <a:avLst/>
+          </a:prstGeom>
+          <a:noFill/>
+        </p:spPr>
+        <p:txBody>
+          <a:bodyPr wrap="square" rtlCol="0">
+            <a:spAutoFit/>
+          </a:bodyPr>
+          <a:lstStyle/>
+          <a:p>
+            <a:r>
+              <a:rPr lang="en-IN" dirty="0"/>
+              <a:t> </a:t>
+            </a:r>
+            <a:r>
+              <a:rPr lang="en-IN" b="1" dirty="0">
+                <a:solidFill>
+                  <a:srgbClr val="FF0000"/>
+                </a:solidFill>
+                <a:latin typeface="Constantia" panose="02030602050306030303" pitchFamily="18" charset="0"/>
+              </a:rPr>
+              <a:t>Flavius</a:t>
+            </a:r>
+            <a:r>
+              <a:rPr lang="en-IN" b="1" dirty="0">
+                <a:latin typeface="Constantia" panose="02030602050306030303" pitchFamily="18" charset="0"/>
+              </a:rPr>
+              <a:t> </a:t>
+            </a:r>
+            <a:r>
+              <a:rPr lang="en-IN" b="1" dirty="0">
+                <a:solidFill>
+                  <a:srgbClr val="FF0000"/>
+                </a:solidFill>
+                <a:latin typeface="Constantia" panose="02030602050306030303" pitchFamily="18" charset="0"/>
+              </a:rPr>
+              <a:t>Josephus</a:t>
             </a:r>
           </a:p>
         </p:txBody>
@@ -12940,8 +13123,8 @@
         </p:nvSpPr>
         <p:spPr>
           <a:xfrm>
-            <a:off x="2877492" y="3075057"/>
-            <a:ext cx="6678885" cy="707886"/>
+            <a:off x="2420471" y="277906"/>
+            <a:ext cx="8364070" cy="1015663"/>
           </a:xfrm>
           <a:prstGeom prst="rect">
             <a:avLst/>
@@ -12956,20 +13139,62 @@
           <a:p>
             <a:pPr algn="just"/>
             <a:r>
-              <a:rPr lang="en-US" sz="4000" dirty="0">
+              <a:rPr lang="en-US" sz="4800" dirty="0">
                 <a:latin typeface="Bahnschrift SemiBold" panose="020B0502040204020203" pitchFamily="34" charset="0"/>
+              </a:rPr>
+              <a:t> </a:t>
+            </a:r>
+            <a:r>
+              <a:rPr lang="en-US" sz="6000" b="1" dirty="0">
+                <a:latin typeface="Monotype Corsiva" panose="03010101010201010101" pitchFamily="66" charset="0"/>
               </a:rPr>
               <a:t>What is </a:t>
             </a:r>
             <a:r>
-              <a:rPr lang="en-IN" sz="4000" dirty="0">
-                <a:latin typeface="Bahnschrift SemiBold" panose="020B0502040204020203" pitchFamily="34" charset="0"/>
+              <a:rPr lang="en-IN" sz="6000" b="1" dirty="0">
+                <a:latin typeface="Monotype Corsiva" panose="03010101010201010101" pitchFamily="66" charset="0"/>
               </a:rPr>
               <a:t>Josephus problem?</a:t>
             </a:r>
           </a:p>
         </p:txBody>
       </p:sp>
+      <p:pic>
+        <p:nvPicPr>
+          <p:cNvPr id="6" name="Picture 5">
+            <a:extLst>
+              <a:ext uri="{FF2B5EF4-FFF2-40B4-BE49-F238E27FC236}">
+                <a16:creationId xmlns:a16="http://schemas.microsoft.com/office/drawing/2014/main" id="{DA882D9A-7889-4C84-8DFB-FF88AD4E0136}"/>
+              </a:ext>
+            </a:extLst>
+          </p:cNvPr>
+          <p:cNvPicPr>
+            <a:picLocks noChangeAspect="1"/>
+          </p:cNvPicPr>
+          <p:nvPr/>
+        </p:nvPicPr>
+        <p:blipFill>
+          <a:blip r:embed="rId2">
+            <a:extLst>
+              <a:ext uri="{28A0092B-C50C-407E-A947-70E740481C1C}">
+                <a14:useLocalDpi xmlns:a14="http://schemas.microsoft.com/office/drawing/2010/main" val="0"/>
+              </a:ext>
+            </a:extLst>
+          </a:blip>
+          <a:stretch>
+            <a:fillRect/>
+          </a:stretch>
+        </p:blipFill>
+        <p:spPr>
+          <a:xfrm>
+            <a:off x="3920938" y="1424268"/>
+            <a:ext cx="4762500" cy="4762500"/>
+          </a:xfrm>
+          <a:prstGeom prst="rect">
+            <a:avLst/>
+          </a:prstGeom>
+        </p:spPr>
+      </p:pic>
     </p:spTree>
     <p:extLst>
       <p:ext uri="{BB962C8B-B14F-4D97-AF65-F5344CB8AC3E}">

</xml_diff>